<commit_message>
v0.03; fixed mis-arrangd test-dataframe slicing
</commit_message>
<xml_diff>
--- a/Project decker.pptx
+++ b/Project decker.pptx
@@ -1073,8 +1073,8 @@
             </a:lnSpc>
           </a:pPr>
           <a:r>
-            <a:rPr lang="en-US"/>
-            <a:t>81.2% (R-squared value) of App’s installs on the Play Store can be explained by the features listed previously.</a:t>
+            <a:rPr lang="en-US" dirty="0"/>
+            <a:t>80.9% (R-squared value) of App’s installs on the Play Store can be explained by the features listed previously.</a:t>
           </a:r>
         </a:p>
       </dgm:t>
@@ -1277,7 +1277,7 @@
   <dgm:whole/>
   <dgm:extLst>
     <a:ext uri="http://schemas.microsoft.com/office/drawing/2008/diagram">
-      <dsp:dataModelExt xmlns:dsp="http://schemas.microsoft.com/office/drawing/2008/diagram" relId="rId6" minVer="http://schemas.openxmlformats.org/drawingml/2006/diagram"/>
+      <dsp:dataModelExt xmlns:dsp="http://schemas.microsoft.com/office/drawing/2008/diagram" relId="rId7" minVer="http://schemas.openxmlformats.org/drawingml/2006/diagram"/>
     </a:ext>
   </dgm:extLst>
 </dgm:dataModel>
@@ -1432,8 +1432,8 @@
             <a:buNone/>
           </a:pPr>
           <a:r>
-            <a:rPr lang="en-US" sz="2100" kern="1200"/>
-            <a:t>81.2% (R-squared value) of App’s installs on the Play Store can be explained by the features listed previously.</a:t>
+            <a:rPr lang="en-US" sz="2100" kern="1200" dirty="0"/>
+            <a:t>80.9% (R-squared value) of App’s installs on the Play Store can be explained by the features listed previously.</a:t>
           </a:r>
         </a:p>
       </dsp:txBody>
@@ -3701,6 +3701,90 @@
 </p:notes>
 </file>
 
+<file path=ppt/notesSlides/notesSlide6.xml><?xml version="1.0" encoding="utf-8"?>
+<p:notes xmlns:a="http://schemas.openxmlformats.org/drawingml/2006/main" xmlns:r="http://schemas.openxmlformats.org/officeDocument/2006/relationships" xmlns:p="http://schemas.openxmlformats.org/presentationml/2006/main">
+  <p:cSld>
+    <p:spTree>
+      <p:nvGrpSpPr>
+        <p:cNvPr id="1" name=""/>
+        <p:cNvGrpSpPr/>
+        <p:nvPr/>
+      </p:nvGrpSpPr>
+      <p:grpSpPr>
+        <a:xfrm>
+          <a:off x="0" y="0"/>
+          <a:ext cx="0" cy="0"/>
+          <a:chOff x="0" y="0"/>
+          <a:chExt cx="0" cy="0"/>
+        </a:xfrm>
+      </p:grpSpPr>
+      <p:sp>
+        <p:nvSpPr>
+          <p:cNvPr id="2" name="Slide Image Placeholder 1"/>
+          <p:cNvSpPr>
+            <a:spLocks noGrp="1" noRot="1" noChangeAspect="1"/>
+          </p:cNvSpPr>
+          <p:nvPr>
+            <p:ph type="sldImg"/>
+          </p:nvPr>
+        </p:nvSpPr>
+        <p:spPr/>
+      </p:sp>
+      <p:sp>
+        <p:nvSpPr>
+          <p:cNvPr id="3" name="Notes Placeholder 2"/>
+          <p:cNvSpPr>
+            <a:spLocks noGrp="1"/>
+          </p:cNvSpPr>
+          <p:nvPr>
+            <p:ph type="body" idx="1"/>
+          </p:nvPr>
+        </p:nvSpPr>
+        <p:spPr/>
+        <p:txBody>
+          <a:bodyPr/>
+          <a:lstStyle/>
+          <a:p>
+            <a:endParaRPr lang="en-US" dirty="0"/>
+          </a:p>
+        </p:txBody>
+      </p:sp>
+      <p:sp>
+        <p:nvSpPr>
+          <p:cNvPr id="4" name="Slide Number Placeholder 3"/>
+          <p:cNvSpPr>
+            <a:spLocks noGrp="1"/>
+          </p:cNvSpPr>
+          <p:nvPr>
+            <p:ph type="sldNum" sz="quarter" idx="5"/>
+          </p:nvPr>
+        </p:nvSpPr>
+        <p:spPr/>
+        <p:txBody>
+          <a:bodyPr/>
+          <a:lstStyle/>
+          <a:p>
+            <a:fld id="{05E0A130-5CB4-1440-98AF-5DB640FD53FB}" type="slidenum">
+              <a:rPr lang="en-US" smtClean="0"/>
+              <a:t>11</a:t>
+            </a:fld>
+            <a:endParaRPr lang="en-US"/>
+          </a:p>
+        </p:txBody>
+      </p:sp>
+    </p:spTree>
+    <p:extLst>
+      <p:ext uri="{BB962C8B-B14F-4D97-AF65-F5344CB8AC3E}">
+        <p14:creationId xmlns:p14="http://schemas.microsoft.com/office/powerpoint/2010/main" val="3137206502"/>
+      </p:ext>
+    </p:extLst>
+  </p:cSld>
+  <p:clrMapOvr>
+    <a:masterClrMapping/>
+  </p:clrMapOvr>
+</p:notes>
+</file>
+
 <file path=ppt/slideLayouts/slideLayout1.xml><?xml version="1.0" encoding="utf-8"?>
 <p:sldLayout xmlns:a="http://schemas.openxmlformats.org/drawingml/2006/main" xmlns:r="http://schemas.openxmlformats.org/officeDocument/2006/relationships" xmlns:p="http://schemas.openxmlformats.org/presentationml/2006/main" type="title" preserve="1">
   <p:cSld name="Title Slide">
@@ -8752,7 +8836,7 @@
             <a:pPr algn="ctr"/>
             <a:r>
               <a:rPr lang="en-US" dirty="0"/>
-              <a:t>0.815</a:t>
+              <a:t>0.793</a:t>
             </a:r>
           </a:p>
           <a:p>
@@ -8805,17 +8889,17 @@
             <a:pPr algn="ctr"/>
             <a:r>
               <a:rPr lang="en-US" dirty="0"/>
-              <a:t>Test: .370</a:t>
+              <a:t>Test: .379</a:t>
             </a:r>
           </a:p>
         </p:txBody>
       </p:sp>
       <p:pic>
         <p:nvPicPr>
-          <p:cNvPr id="10" name="Picture 9">
+          <p:cNvPr id="4" name="Picture 3">
             <a:extLst>
               <a:ext uri="{FF2B5EF4-FFF2-40B4-BE49-F238E27FC236}">
-                <a16:creationId xmlns:a16="http://schemas.microsoft.com/office/drawing/2014/main" id="{4974051F-C31B-5340-94CC-A18371FCA69E}"/>
+                <a16:creationId xmlns:a16="http://schemas.microsoft.com/office/drawing/2014/main" id="{1B50D224-81EE-8644-B939-6244DF843806}"/>
               </a:ext>
             </a:extLst>
           </p:cNvPr>
@@ -8832,8 +8916,8 @@
         </p:blipFill>
         <p:spPr>
           <a:xfrm>
-            <a:off x="1003262" y="1885285"/>
-            <a:ext cx="5789531" cy="3612002"/>
+            <a:off x="1256973" y="1849520"/>
+            <a:ext cx="5466602" cy="3789280"/>
           </a:xfrm>
           <a:prstGeom prst="rect">
             <a:avLst/>
@@ -8895,10 +8979,10 @@
       </p:sp>
       <p:pic>
         <p:nvPicPr>
-          <p:cNvPr id="13" name="Picture 12">
+          <p:cNvPr id="5" name="Picture 4">
             <a:extLst>
               <a:ext uri="{FF2B5EF4-FFF2-40B4-BE49-F238E27FC236}">
-                <a16:creationId xmlns:a16="http://schemas.microsoft.com/office/drawing/2014/main" id="{FC75F83B-AF73-FB4A-842A-3A5CA6F7252E}"/>
+                <a16:creationId xmlns:a16="http://schemas.microsoft.com/office/drawing/2014/main" id="{3B5B392F-36BE-F844-A68E-623913B31DA3}"/>
               </a:ext>
             </a:extLst>
           </p:cNvPr>
@@ -8915,8 +8999,8 @@
         </p:blipFill>
         <p:spPr>
           <a:xfrm>
-            <a:off x="6975802" y="1885284"/>
-            <a:ext cx="4357216" cy="3612001"/>
+            <a:off x="6856285" y="1849519"/>
+            <a:ext cx="4475330" cy="3789280"/>
           </a:xfrm>
           <a:prstGeom prst="rect">
             <a:avLst/>
@@ -9187,7 +9271,7 @@
             <p:ph idx="1"/>
             <p:extLst>
               <p:ext uri="{D42A27DB-BD31-4B8C-83A1-F6EECF244321}">
-                <p14:modId xmlns:p14="http://schemas.microsoft.com/office/powerpoint/2010/main" val="3368363406"/>
+                <p14:modId xmlns:p14="http://schemas.microsoft.com/office/powerpoint/2010/main" val="2600451760"/>
               </p:ext>
             </p:extLst>
           </p:nvPr>
@@ -9198,7 +9282,7 @@
         </p:xfrm>
         <a:graphic>
           <a:graphicData uri="http://schemas.openxmlformats.org/drawingml/2006/diagram">
-            <dgm:relIds xmlns:dgm="http://schemas.openxmlformats.org/drawingml/2006/diagram" xmlns:r="http://schemas.openxmlformats.org/officeDocument/2006/relationships" r:dm="rId2" r:lo="rId3" r:qs="rId4" r:cs="rId5"/>
+            <dgm:relIds xmlns:dgm="http://schemas.openxmlformats.org/drawingml/2006/diagram" xmlns:r="http://schemas.openxmlformats.org/officeDocument/2006/relationships" r:dm="rId3" r:lo="rId4" r:qs="rId5" r:cs="rId6"/>
           </a:graphicData>
         </a:graphic>
       </p:graphicFrame>
@@ -12150,8 +12234,8 @@
         </p:blipFill>
         <p:spPr>
           <a:xfrm>
-            <a:off x="6084791" y="1375865"/>
-            <a:ext cx="4340313" cy="1486557"/>
+            <a:off x="6081564" y="3724517"/>
+            <a:ext cx="4340313" cy="2091253"/>
           </a:xfrm>
           <a:prstGeom prst="rect">
             <a:avLst/>
@@ -12183,8 +12267,8 @@
         </p:blipFill>
         <p:spPr>
           <a:xfrm>
-            <a:off x="6084791" y="4193189"/>
-            <a:ext cx="4341729" cy="1085432"/>
+            <a:off x="6121395" y="1196024"/>
+            <a:ext cx="4341729" cy="1807027"/>
           </a:xfrm>
           <a:prstGeom prst="rect">
             <a:avLst/>

</xml_diff>